<commit_message>
green within software v1
</commit_message>
<xml_diff>
--- a/Generated_Recommendation_Report_Streamlined.pptx
+++ b/Generated_Recommendation_Report_Streamlined.pptx
@@ -128,6 +128,11 @@
       </a:defRPr>
     </a:lvl9pPr>
   </p:defaultTextStyle>
+  <p:extLst>
+    <p:ext uri="{EFAFB233-063F-42B5-8137-9DF3F51BA10A}">
+      <p15:sldGuideLst xmlns:p15="http://schemas.microsoft.com/office/powerpoint/2012/main"/>
+    </p:ext>
+  </p:extLst>
 </p:presentation>
 </file>
 
@@ -1541,7 +1546,7 @@
             <a:fld id="{48A87A34-81AB-432B-8DAE-1953F412C126}" type="datetimeFigureOut">
               <a:rPr lang="en-US" dirty="0"/>
               <a:pPr/>
-              <a:t>4/22/2025</a:t>
+              <a:t>4/29/2025</a:t>
             </a:fld>
             <a:endParaRPr lang="en-US" dirty="0"/>
           </a:p>
@@ -2995,7 +3000,7 @@
           <a:p>
             <a:fld id="{48A87A34-81AB-432B-8DAE-1953F412C126}" type="datetimeFigureOut">
               <a:rPr lang="en-US" dirty="0"/>
-              <a:t>4/22/2025</a:t>
+              <a:t>4/29/2025</a:t>
             </a:fld>
             <a:endParaRPr lang="en-US" dirty="0"/>
           </a:p>
@@ -4443,7 +4448,7 @@
           <a:p>
             <a:fld id="{48A87A34-81AB-432B-8DAE-1953F412C126}" type="datetimeFigureOut">
               <a:rPr lang="en-US" dirty="0"/>
-              <a:t>4/22/2025</a:t>
+              <a:t>4/29/2025</a:t>
             </a:fld>
             <a:endParaRPr lang="en-US" dirty="0"/>
           </a:p>
@@ -5803,7 +5808,7 @@
           <a:bodyPr/>
           <a:lstStyle>
             <a:lvl1pPr>
-              <a:defRPr>
+              <a:defRPr sz="3200">
                 <a:solidFill>
                   <a:srgbClr val="FFFEFF"/>
                 </a:solidFill>
@@ -5812,10 +5817,9 @@
           </a:lstStyle>
           <a:p>
             <a:r>
-              <a:rPr lang="en-US"/>
+              <a:rPr lang="en-US" dirty="0"/>
               <a:t>Click to edit Master title style</a:t>
             </a:r>
-            <a:endParaRPr lang="en-US" dirty="0"/>
           </a:p>
         </p:txBody>
       </p:sp>
@@ -5831,48 +5835,25 @@
         </p:nvSpPr>
         <p:spPr>
           <a:xfrm>
-            <a:off x="5118447" y="803186"/>
-            <a:ext cx="6281873" cy="5248622"/>
+            <a:off x="4587334" y="827088"/>
+            <a:ext cx="6796946" cy="5224720"/>
           </a:xfrm>
         </p:spPr>
         <p:txBody>
-          <a:bodyPr anchor="ctr"/>
-          <a:lstStyle/>
+          <a:bodyPr anchor="ctr">
+            <a:normAutofit/>
+          </a:bodyPr>
+          <a:lstStyle>
+            <a:lvl1pPr>
+              <a:defRPr sz="1400"/>
+            </a:lvl1pPr>
+          </a:lstStyle>
           <a:p>
             <a:pPr lvl="0"/>
             <a:r>
-              <a:rPr lang="en-US"/>
+              <a:rPr lang="en-US" dirty="0"/>
               <a:t>Click to edit Master text styles</a:t>
             </a:r>
-          </a:p>
-          <a:p>
-            <a:pPr lvl="1"/>
-            <a:r>
-              <a:rPr lang="en-US"/>
-              <a:t>Second level</a:t>
-            </a:r>
-          </a:p>
-          <a:p>
-            <a:pPr lvl="2"/>
-            <a:r>
-              <a:rPr lang="en-US"/>
-              <a:t>Third level</a:t>
-            </a:r>
-          </a:p>
-          <a:p>
-            <a:pPr lvl="3"/>
-            <a:r>
-              <a:rPr lang="en-US"/>
-              <a:t>Fourth level</a:t>
-            </a:r>
-          </a:p>
-          <a:p>
-            <a:pPr lvl="4"/>
-            <a:r>
-              <a:rPr lang="en-US"/>
-              <a:t>Fifth level</a:t>
-            </a:r>
-            <a:endParaRPr lang="en-US" dirty="0"/>
           </a:p>
         </p:txBody>
       </p:sp>
@@ -5893,7 +5874,7 @@
           <a:p>
             <a:fld id="{48A87A34-81AB-432B-8DAE-1953F412C126}" type="datetimeFigureOut">
               <a:rPr lang="en-US" dirty="0"/>
-              <a:t>4/22/2025</a:t>
+              <a:t>4/29/2025</a:t>
             </a:fld>
             <a:endParaRPr lang="en-US" dirty="0"/>
           </a:p>
@@ -7396,7 +7377,7 @@
           <a:p>
             <a:fld id="{48A87A34-81AB-432B-8DAE-1953F412C126}" type="datetimeFigureOut">
               <a:rPr lang="en-US" dirty="0"/>
-              <a:t>4/22/2025</a:t>
+              <a:t>4/29/2025</a:t>
             </a:fld>
             <a:endParaRPr lang="en-US" dirty="0"/>
           </a:p>
@@ -8912,7 +8893,7 @@
           <a:p>
             <a:fld id="{48A87A34-81AB-432B-8DAE-1953F412C126}" type="datetimeFigureOut">
               <a:rPr lang="en-US" dirty="0"/>
-              <a:t>4/22/2025</a:t>
+              <a:t>4/29/2025</a:t>
             </a:fld>
             <a:endParaRPr lang="en-US" dirty="0"/>
           </a:p>
@@ -10572,7 +10553,7 @@
           <a:p>
             <a:fld id="{48A87A34-81AB-432B-8DAE-1953F412C126}" type="datetimeFigureOut">
               <a:rPr lang="en-US" dirty="0"/>
-              <a:t>4/22/2025</a:t>
+              <a:t>4/29/2025</a:t>
             </a:fld>
             <a:endParaRPr lang="en-US" dirty="0"/>
           </a:p>
@@ -11932,7 +11913,7 @@
           <a:bodyPr/>
           <a:lstStyle>
             <a:lvl1pPr>
-              <a:defRPr>
+              <a:defRPr sz="3200">
                 <a:solidFill>
                   <a:srgbClr val="FFFEFF"/>
                 </a:solidFill>
@@ -11941,10 +11922,9 @@
           </a:lstStyle>
           <a:p>
             <a:r>
-              <a:rPr lang="en-US"/>
+              <a:rPr lang="en-US" dirty="0"/>
               <a:t>Click to edit Master title style</a:t>
             </a:r>
-            <a:endParaRPr lang="en-US" dirty="0"/>
           </a:p>
         </p:txBody>
       </p:sp>
@@ -11965,7 +11945,7 @@
           <a:p>
             <a:fld id="{48A87A34-81AB-432B-8DAE-1953F412C126}" type="datetimeFigureOut">
               <a:rPr lang="en-US" dirty="0"/>
-              <a:t>4/22/2025</a:t>
+              <a:t>4/29/2025</a:t>
             </a:fld>
             <a:endParaRPr lang="en-US" dirty="0"/>
           </a:p>
@@ -12060,7 +12040,7 @@
           <a:p>
             <a:fld id="{48A87A34-81AB-432B-8DAE-1953F412C126}" type="datetimeFigureOut">
               <a:rPr lang="en-US" dirty="0"/>
-              <a:t>4/22/2025</a:t>
+              <a:t>4/29/2025</a:t>
             </a:fld>
             <a:endParaRPr lang="en-US" dirty="0"/>
           </a:p>
@@ -13581,7 +13561,7 @@
           <a:p>
             <a:fld id="{48A87A34-81AB-432B-8DAE-1953F412C126}" type="datetimeFigureOut">
               <a:rPr lang="en-US" dirty="0"/>
-              <a:t>4/22/2025</a:t>
+              <a:t>4/29/2025</a:t>
             </a:fld>
             <a:endParaRPr lang="en-US" dirty="0"/>
           </a:p>
@@ -15112,7 +15092,7 @@
           <a:p>
             <a:fld id="{48A87A34-81AB-432B-8DAE-1953F412C126}" type="datetimeFigureOut">
               <a:rPr lang="en-US" dirty="0"/>
-              <a:t>4/22/2025</a:t>
+              <a:t>4/29/2025</a:t>
             </a:fld>
             <a:endParaRPr lang="en-US" dirty="0"/>
           </a:p>
@@ -15331,7 +15311,7 @@
             <a:fld id="{48A87A34-81AB-432B-8DAE-1953F412C126}" type="datetimeFigureOut">
               <a:rPr lang="en-US" dirty="0"/>
               <a:pPr/>
-              <a:t>4/22/2025</a:t>
+              <a:t>4/29/2025</a:t>
             </a:fld>
             <a:endParaRPr lang="en-US" dirty="0"/>
           </a:p>
@@ -15872,21 +15852,21 @@
           <a:p>
             <a:pPr algn="just"/>
             <a:r>
-              <a:t>The organization lacks a robust data management framework, resulting in significant risks to business continuity, data integrity, and regulatory compliance.  This includes critical gaps in data movement documentation, decommissioning strategies for outdated infrastructure, standardized data movement protocols, and a comprehensive backup and archive strategy.  Implementing these missing processes and associated documentation will require substantial cross-functional collaboration and resource allocation (hundreds of man-hours across multiple projects).</a:t>
+              <a:t>The organization faces substantial risk due to a complete lack of formal data governance. Missing policies for data movement, retention, and archiving, combined with absent standardized transfer protocols, creates vulnerabilities to data inconsistencies, compliance failures, and operational inefficiencies. Immediate action is needed to define and implement these foundational data management practices.</a:t>
             </a:r>
           </a:p>
           <a:p/>
           <a:p>
             <a:pPr algn="just"/>
             <a:r>
-              <a:t>Establishing and implementing comprehensive data retention and archiving policies is crucial to mitigate identified risks and improve operational maturity.  The current absence of these policies poses a substantial threat to data integrity and regulatory compliance.</a:t>
+              <a:t>A critical and unaddressed weakness exists in organizational resilience. The absence of implemented backup/recovery strategies, disaster recovery plans, and associated testing leaves the organization highly susceptible to data loss and business disruption, requiring a significant investment – estimated at over 250 man-hours – to establish even minimal protection measures.</a:t>
             </a:r>
           </a:p>
           <a:p/>
           <a:p>
             <a:pPr algn="just"/>
             <a:r>
-              <a:t>Addressing these deficiencies necessitates a multi-phased approach involving data engineers, architects, infrastructure specialists, IT security, and business analysts to develop and implement a complete data management strategy.  This includes defining clear roles and responsibilities, establishing standardized procedures, and allocating sufficient resources for successful implementation and ongoing maintenance.</a:t>
+              <a:t>The organization’s IT infrastructure is operating without proactive lifecycle management, increasing technical debt and limiting future scalability. The lack of system decommissioning processes and regular architecture reviews indicates a reliance on potentially outdated technology and hinders the ability to adapt to changing business requirements.</a:t>
             </a:r>
           </a:p>
         </p:txBody>
@@ -15953,21 +15933,21 @@
           <a:p>
             <a:pPr algn="just"/>
             <a:r>
-              <a:t>This roadmap enhances operational integrity and modernizes IT infrastructure by addressing critical gaps in data management, infrastructure decommissioning, and disaster recovery.  It begins by analyzing existing processes, identifying outdated infrastructure, and assessing data criticality.  The intermediate phase focuses on process alignment, automation, and developing comprehensive backup and archive strategies.  The advanced phase implements standardized protocols, establishes governance, and ensures robust resilience through comprehensive documentation, testing, and the implementation of a data management policy and disaster recovery solution.</a:t>
+              <a:t>This roadmap addresses critical gaps in data management, IT operations, and disaster recovery to enhance data integrity, business continuity, and compliance. The initial phase focuses on assessing the current state and prioritizing areas for improvement. The intermediate phase centers on standardizing processes and aligning them with architectural boundaries. Finally, the advanced phase implements these strategies, conducts thorough testing, and establishes ongoing governance to ensure sustained resilience and alignment with evolving business needs.</a:t>
             </a:r>
           </a:p>
           <a:p/>
           <a:p>
             <a:pPr algn="just"/>
             <a:r>
-              <a:t>Total Est: 625 hrs (~78.1 days)</a:t>
+              <a:t>Total Est: 417 hrs (~52.1 days)</a:t>
             </a:r>
           </a:p>
           <a:p/>
           <a:p>
             <a:pPr algn="just"/>
             <a:r>
-              <a:t>Key Roles: Data Engineers, Solution Architects, Data Owners, IT Operations, Infrastructure Specialist, Audit Team, Strategy Development Team, Review Team, Documentation Specialist, Communication Coordinator, Data Architect, Networking Specialist, Infrastructure Team, Testing Team, System Owners, Protocol Designer, Training Coordinator, IT Security Specialist, Backup Strategist, DR Specialists, BC Specialists, Analysis Team, IT Specialists, DR Administrators, Testing Teams, Enterprise Architects, Business Analysts, Disaster Recovery Coordinators</a:t>
+              <a:t>Key Roles: Data Engineers, Solution Architects, Documentation Specialist, Communication Coordinator, Infrastructure Specialist, Audit Team, Strategy Development Team, Data Architect, Networking Specialist, Infrastructure Team, Testing Team, System Owners, Protocol Designer, Training Coordinator, IT Operations, IT Security Specialist, Backup Strategist, DR Specialists, BC Specialists, Business Analysts, IT Administrators, Analysis Team, Review Team, Enterprise Architects, Testing Coordinator</a:t>
             </a:r>
           </a:p>
         </p:txBody>
@@ -16048,7 +16028,7 @@
           <a:p>
             <a:pPr algn="just"/>
             <a:r>
-              <a:t>1. Analyze existing data movement processes to identify gaps and inefficiencies; conduct a comprehensive audit to identify outdated or underutilized infrastructure components. 2. Assess criticality of different data sets to define backup and archive priorities; document the current Disaster Recovery (DR) and Business Continuity (BC) protocols. 3. Map data movement requirements across various systems and applications; define a periodic schedule for architecture boundary reviews. </a:t>
+              <a:t>1. Analyze existing data movement processes to identify gaps and inefficiencies. 2. Conduct a comprehensive audit to identify outdated or underutilized infrastructure components. 3. Assess the criticality of different data sets to define backup and archive priorities. 4. Document current Disaster Recovery (DR) and Business Continuity (BC) protocols. 5. Develop a test plan outlining scenarios for backup and recovery testing. 6. Define a periodic schedule for architecture boundary reviews. 7. Collaborate with specialists to refine assessment findings. </a:t>
             </a:r>
           </a:p>
           <a:p>
@@ -16060,7 +16040,7 @@
           <a:p>
             <a:pPr algn="just"/>
             <a:r>
-              <a:t>1. Align data movement processes within defined architecture boundaries; develop a strategy outlining the criteria, process, and timeline for decommissioning identified components. 2. Design a comprehensive strategy for backups and archives based on criticality; identify areas of improvement in existing DR and BC protocols. 3. Design a standardized protocol for data movement based on mapping results; assess evolving business needs and their alignment with existing architecture. </a:t>
+              <a:t>1. Align data movement processes within defined architecture boundaries. 2. Develop a decommissioning strategy outlining criteria, process, and timeline. 3. Standardize protocols for efficient data movement across infrastructure elements. 4. Design a comprehensive strategy for backups and archives based on criticality. 5. Assess evolving business needs and their alignment with existing architecture. 6. Conduct interviews and data collection to support process updates. </a:t>
             </a:r>
           </a:p>
           <a:p>
@@ -16072,14 +16052,14 @@
           <a:p>
             <a:pPr algn="just"/>
             <a:r>
-              <a:t>1. Document the aligned processes and communicate changes to relevant teams; establish a routine for reviewing and updating the decommissioning strategy. 2. Document the strategy and conduct testing to ensure effectiveness; update DR and BC protocols based on identified improvements. 3. Implement standardized protocols and conduct thorough testing; document the standardized protocol and conduct training for relevant teams. 4. Propose updates to architecture boundaries based on the assessment; develop a disaster recovery policy defining steps and responsibilities during failures. 5. Evaluate and select a disaster recovery solution aligned with policy requirements; implement the selected DR solution and conduct testing. 6. Develop a test plan outlining scenarios for backup and recovery testing; conduct regular backup and recovery testing based on the developed plan.</a:t>
+              <a:t>1. Document aligned processes and communicate changes to relevant teams. 2. Establish a routine for reviewing and updating the decommissioning strategy. 3. Implement standardized protocols and conduct thorough testing. 4. Document the standardized protocol and conduct training for relevant teams. 5. Document the strategy and conduct testing to ensure effectiveness. 6. Propose updates to architecture boundaries based on the assessment. 7. Update DR and BC protocols based on identified improvements.</a:t>
             </a:r>
           </a:p>
           <a:p/>
           <a:p>
             <a:pPr algn="just"/>
             <a:r>
-              <a:t>Tools/Platforms (Overall): Amanda, Rubrik, Zerto, Bacula, Commvault, Veeam Backup &amp; Replication</a:t>
+              <a:t>Tools/Platforms (Overall): Amanda, Bacula, Rubrik, Zerto, Commvault, Veeam Backup &amp; Replication</a:t>
             </a:r>
           </a:p>
           <a:p/>
@@ -16092,7 +16072,7 @@
           <a:p>
             <a:pPr algn="just"/>
             <a:r>
-              <a:t>--- Early Steps --- Analysis Collaboration: 18 hours; Gap Identification: 28 hours; Collaboration and Planning: 20 hours; Infrastructure Audit: 30 hours; Collaboration and Planning: 15 hours; Criticality Assessment: 25 hours; Documentation Review: 20 hours; Collaboration with Specialists: 15 hours; Collaboration with System Owners: 20 hours; Data Mapping: 30 hours; Schedule Definition: 15 hours; Collaboration with Architecture Teams: 25 hours --- Intermediate Steps --- Collaboration with Architecture: 22 hours; Process Updates: 20 hours; Team Collaboration: 18 hours; Document Development: 25 hours; Strategy Design: 30 hours; Alignment with Business Needs: 20 hours; Thorough Analysis: 30 hours; Best Practices Review: 25 hours; Protocol Design: 35 hours; Alignment with Business Needs: 15 hours; Interviews and Data Collection: 30 hours; Alignment Analysis: 20 hours --- Advanced Steps --- Documentation: 25 hours; Communication Sessions: 15 hours; Periodic Reviews: 22 hours; Strategy Updates: 20 hours; Documentation: 18 hours; Testing Scenarios: 22 hours; Collaboration with Specialists: 20 hours; Update Implementation: 25 hours; Implementation: 30 hours; Testing and Performance Monitoring: 35 hours; Documentation: 22 hours; Training Sessions: 18 hours; Collaboration with Architecture Teams: 25 hours; Update Proposal: 25 hours; Policy Development: 20 hours; Collaboration with IT Teams: 15 hours; Research: 25 hours; Alignment with Policy Requirements: 20 hours; Configuration: 30 hours; Failure Simulation Testing: 25 hours; Test Plan Development: 20 hours; Collaboration with IT Teams: 15 hours; Testing Execution: 30 hours; Results Analysis: 25 hours</a:t>
+              <a:t>--- Early Steps --- Analysis Collaboration - 18h; Gap Identification - 28h; Collaboration and Planning - 35h; Infrastructure Audit - 30h; Criticality Assessment - 25h; Documentation Review - 20h; Test Plan Development - 20h; Schedule Definition - 15h; Collaboration with Architecture Teams - 25h. --- Intermediate Steps --- Collaboration with Architecture - 22h; Process Updates - 20h; Team Collaboration - 18h; Document Development - 25h; Research and Standardization - 20h; Protocol Implementation - 28h; Strategy Design - 30h; Alignment with Business Needs - 20h; Interviews and Data Collection - 30h; Alignment Analysis - 20h. --- Advanced Steps --- Documentation - 65h; Communication Sessions - 15h; Periodic Reviews - 22h; Strategy Updates - 20h; Implementation - 30h; Testing and Performance Monitoring - 35h; Training Sessions - 18h; Update Proposal - 25h; Update Implementation - 25h; Collaboration with Specialists - 20h.</a:t>
             </a:r>
           </a:p>
         </p:txBody>
@@ -16216,21 +16196,21 @@
           <a:p>
             <a:pPr algn="just"/>
             <a:r>
-              <a:t>The organization lacks a formal framework for managing the environmental impact of its IT operations, including processes, tools, and skilled personnel.  This deficiency hinders effective measurement of Green IT initiatives and prevents demonstration of return on investment.</a:t>
+              <a:t>The organization fundamentally lacks the ability to measure the impact of its Green IT efforts, consistently failing to quantify reductions in energy consumption, cost savings, or carbon footprint. This absence of data prevents informed decision-making, ROI demonstration, and effective progress tracking towards sustainability objectives.</a:t>
             </a:r>
           </a:p>
           <a:p/>
           <a:p>
             <a:pPr algn="just"/>
             <a:r>
-              <a:t>Significant organizational barriers, such as budget limitations, lack of executive sponsorship, and resistance to change, impede the adoption and scaling of Green IT practices.  Overcoming these hurdles is crucial for progress.</a:t>
+              <a:t>A comprehensive environmental management system is entirely absent, with no implemented processes or tools for assessment, optimization, or skills development related to sustainable IT practices. This extends to a complete lack of resource optimization initiatives and dedicated training programs for staff.</a:t>
             </a:r>
           </a:p>
           <a:p/>
           <a:p>
             <a:pPr algn="just"/>
             <a:r>
-              <a:t>The absence of robust data collection and analysis regarding energy consumption and cost savings within IT prevents accurate assessment of current environmental impact and informed decision-making for future Green IT investments.</a:t>
+              <a:t>Multiple, interconnected barriers – including cost, expertise gaps, lack of executive support, and limited awareness – are preventing Green IT implementation. These challenges indicate a need for a holistic strategy addressing both technical deficiencies and organizational culture to foster sustainable IT adoption.</a:t>
             </a:r>
           </a:p>
         </p:txBody>
@@ -16297,21 +16277,21 @@
           <a:p>
             <a:pPr algn="just"/>
             <a:r>
-              <a:t>This roadmap outlines the implementation of a Green IT strategy, progressing from assessing the current environmental impact of IT operations and evaluating suitable tools, to designing resource optimization processes and developing training programs, and finally, implementing chosen tools, delivering training, and establishing incentive programs to foster a carbon-literate workforce and improve environmental performance.</a:t>
+              <a:t>This roadmap outlines a phased approach to integrate Green IT practices within the organization. The initial Early Steps focus on establishing a baseline understanding of the current environmental impact of IT operations and defining sustainability goals. The Intermediate Steps involve designing and implementing processes for resource optimization, integrating sustainability tools, and developing targeted training programs. Finally, the Advanced Steps concentrate on continuous improvement through ongoing monitoring, assessment, and training, alongside a plan to attract and retain personnel with carbon literacy.</a:t>
             </a:r>
           </a:p>
           <a:p/>
           <a:p>
             <a:pPr algn="just"/>
             <a:r>
-              <a:t>Total Est: 621 hrs (~77.6 days)</a:t>
+              <a:t>Total Est: 626 hrs (~78.2 days)</a:t>
             </a:r>
           </a:p>
           <a:p/>
           <a:p>
             <a:pPr algn="just"/>
             <a:r>
-              <a:t>Key Roles: Environmental Experts, Infrastructure Managers, IT Specialists, Sustainability Analysts, Tool Administrators, Training Coordinators, Environmental Specialist, IT Operations, Process Design Expert, Documentation Specialist, Training Coordinator, Training Analysts, Department Heads, Training Facilitators, Program Designers, Program Coordinators, Sustainability Experts, Team Leads, Communication Specialists, HR Specialists, Assessment Designers, Subject Matter Experts, Assessment Administrators, Training Instructors, HR Representatives, HR Analysts, Sustainability Strategists</a:t>
+              <a:t>Key Roles: Environmental Experts, Infrastructure Managers, IT Specialists, Sustainability Analysts, Tool Administrators, Training Coordinators, Process Design Expert, Training Analysts, Department Heads, Training Facilitators, Program Designers, HR Specialists, Assessment Administrators, Communication Specialists, Sustainability Strategists, HR Analysts, Documentation Specialist, Training Instructors, HR Representatives, Sustainability Experts</a:t>
             </a:r>
           </a:p>
         </p:txBody>
@@ -16392,7 +16372,7 @@
           <a:p>
             <a:pPr algn="just"/>
             <a:r>
-              <a:t>1. Assess the current environmental impact of infrastructure and processes. 2. Evaluate existing and potential tools for managing sustainability. 3. Conduct an assessment of environmental impact in the current environment and identify specific sustainability-focused skills that need development. </a:t>
+              <a:t>1. Assess the current environmental impact of infrastructure and processes, collaborating with environmental experts and using impact assessment tools. 2. Evaluate existing and potential tools for managing sustainability, researching available options and collaborating with IT teams. 3. Conduct an assessment of environmental impact in the current environment, collaborating with environmental specialists. 4. Define proficiency criteria for assessing sustainability-related skills, collaborating with subject matter experts. 5. Identify specific sustainability-focused skills that need development, conducting skill gap analysis and collaborating with department heads. 6. Define a structured incentive plan for carbon-literate resources, collaborating with HR.</a:t>
             </a:r>
           </a:p>
           <a:p>
@@ -16404,7 +16384,7 @@
           <a:p>
             <a:pPr algn="just"/>
             <a:r>
-              <a:t>1. Design processes to optimize resource usage based on assessment results. 2. Design training programs for sustainability-focused skills development. 3. Define the skills required for sustainability initiatives and document them. </a:t>
+              <a:t>1. Design processes to optimize resource usage based on assessment results, collaborating with process design experts and aligning with environmental goals. 2. Implement selected tools and provide training to relevant teams, configuring tools and conducting training sessions. 3. Design training programs for sustainability-focused skills development, collaborating with trainers and defining program content. 4. Communicate the defined skills across teams effectively, conducting workshops and using communication channels. 5. Develop training programs to address identified needs, designing curriculum and sourcing/developing training materials.</a:t>
             </a:r>
           </a:p>
           <a:p>
@@ -16416,14 +16396,14 @@
           <a:p>
             <a:pPr algn="just"/>
             <a:r>
-              <a:t>1. Implement selected tools and provide training to relevant teams. 2. Implement the training programs and track participant progress. 3. Communicate the defined skills across teams effectively and establish a mechanism for feedback on skill understanding. 4. Define a structured incentive plan for carbon-literate resources, communicate the plan to employees, and create awareness. 5. Monitor the effectiveness of incentives and evaluate employee retention. 6. Conduct training sessions, either in-person or through digital platforms. </a:t>
+              <a:t>1. Document the established processes and conduct training for relevant teams, using documentation tools and organizing training sessions. 2. Implement the training programs and track participant progress, conducting training sessions and monitoring participant engagement. 3. Establish a mechanism for feedback on skill understanding, setting up feedback sessions and collecting input. 4. Monitor the effectiveness of incentives and evaluate employee retention, collecting feedback and analyzing retention data. 5. Implement the assessment process and analyze results, conducting assessments, gathering feedback, and analyzing performance. 6. Deliver training sessions, either in-person or through digital platforms, facilitating sessions and tracking attendance and participation.</a:t>
             </a:r>
           </a:p>
           <a:p/>
           <a:p>
             <a:pPr algn="just"/>
             <a:r>
-              <a:t>Tools/Platforms (Overall): Impact assessment tools, Documentation tools, Training platforms</a:t>
+              <a:t>Tools/Platforms (Overall): Impact assessment tools, Sustainability tools, Documentation tools, Training platforms, Assessment tools</a:t>
             </a:r>
           </a:p>
           <a:p/>
@@ -16436,7 +16416,25 @@
           <a:p>
             <a:pPr algn="just"/>
             <a:r>
-              <a:t>--- Early Steps --- Environmental Assessment: 30 hours; Collaboration with Experts: 20 hours; Tool Research: 25 hours; Collaboration with IT Teams: 15 hours; Collaboration and Planning: 20 hours; Impact Assessment: 30 hours; Skill Gap Analysis: 20 hours; Collaboration with Department Heads: 15 hours; --- Intermediate Steps --- Process Design: 25 hours; Alignment with Goals: 18 hours; Program Design: 30 hours; Collaboration with Trainers: 20 hours; Skill Definition: 20 hours; Collaboration with Experts: 15 hours; --- Advanced Steps --- Tool Implementation: 40 hours; Training Sessions: 55 hours; Progress Tracking: 25 hours; Workshop Conduct: 25 hours; Communication Planning: 15 hours; Feedback Session Setup: 20 hours; Input Collection and Analysis: 15 hours; Incentive Structure Definition: 25 hours; Collaboration with HR: 15 hours; Communication Development: 30 hours; Awareness Sessions: 20 hours; Monitoring: 35 hours; Evaluation: 25 hours; Training Delivery: 35 hours; Attendance Tracking: 25 hours</a:t>
+              <a:t>--- Early Steps ---</a:t>
+            </a:r>
+          </a:p>
+          <a:p>
+            <a:pPr algn="just"/>
+            <a:r>
+              <a:t>Environmental Assessment - 30h; Collaboration with Experts - 20h; Tool Research - 25h; Collaboration with IT Teams - 15h; Collaboration and Planning - 20h; Impact Assessment - 30h; Criteria Definition - 25h; Collaboration with Experts - 15h; Skill Gap Analysis - 20h; Collaboration with Department Heads - 15h; Incentive Structure Definition - 25h; Collaboration with HR - 15h; --- Intermediate Steps ---</a:t>
+            </a:r>
+          </a:p>
+          <a:p>
+            <a:pPr algn="just"/>
+            <a:r>
+              <a:t>Process Design - 25h; Alignment with Goals - 18h; Tool Implementation - 40h; Training Sessions - 20h; Program Design - 30h; Collaboration with Trainers - 20h; Workshop Conduct - 25h; Communication Planning - 15h; Curriculum Design - 30h; Material Development - 20h; --- Advanced Steps ---</a:t>
+            </a:r>
+          </a:p>
+          <a:p>
+            <a:pPr algn="just"/>
+            <a:r>
+              <a:t>Documentation - 22h; Training Sessions - 20h; Training Sessions - 35h; Progress Tracking - 25h; Feedback Session Setup - 20h; Input Collection and Analysis - 15h; Monitoring - 35h; Evaluation - 25h; Assessment Implementation - 35h; Results Analysis - 25h; Training Delivery - 35h; Attendance Tracking - 25h</a:t>
             </a:r>
           </a:p>
         </p:txBody>
@@ -16560,21 +16558,21 @@
           <a:p>
             <a:pPr algn="just"/>
             <a:r>
-              <a:t>The organization lacks a comprehensive strategy for measuring and reducing its IT carbon footprint.  This includes the absence of carbon intensity tracking for IT operations, a calculated IT-related carbon footprint, and any initiatives focused on server energy efficiency or data center cooling optimization.</a:t>
+              <a:t>The organization does not currently measure its IT carbon footprint – including carbon intensity of operations – preventing baseline establishment, target setting, and progress tracking towards emissions reduction.</a:t>
             </a:r>
           </a:p>
           <a:p/>
           <a:p>
             <a:pPr algn="just"/>
             <a:r>
-              <a:t>The organization acknowledges its shortcomings in addressing its IT-related environmental impact and explicitly requests external guidance and support to develop and implement effective carbon reduction strategies.</a:t>
+              <a:t>A clear strategy for reducing the carbon footprint of server operations is absent, with readily available optimization techniques (like cooling improvements) currently unutilized, indicating a gap between knowledge and practical implementation.</a:t>
             </a:r>
           </a:p>
           <a:p/>
           <a:p>
             <a:pPr algn="just"/>
             <a:r>
-              <a:t>Implementation of carbon reduction strategies requires significant external support, indicating a need for substantial investment in expertise and resources to achieve meaningful progress in this area.</a:t>
+              <a:t>Limited proactive steps have been taken to reduce IT-related carbon emissions, suggesting carbon efficiency is not a prioritized business objective and represents a substantial area for improvement and potential cost savings.</a:t>
             </a:r>
           </a:p>
         </p:txBody>
@@ -16706,21 +16704,21 @@
           <a:p>
             <a:pPr algn="just"/>
             <a:r>
-              <a:t>This roadmap details the implementation of an IT carbon efficiency and management program.  It begins with establishing a baseline carbon footprint for IT operations, identifying key areas for improvement, and initiating collaboration with environmental experts.  Next, a reduction strategy is developed and implemented, including energy-efficient practices and renewable energy utilization, along with an energy efficiency audit of data centers, focusing on cooling systems.  Finally, the plan culminates in cooling optimization based on audit findings and the establishment of ongoing monitoring to ensure sustained carbon reduction.</a:t>
+              <a:t>This roadmap outlines a phased approach to reducing the carbon footprint of IT operations. It begins with a comprehensive assessment of current energy consumption and carbon intensity, followed by the development and implementation of strategies to optimize server operations and cooling systems. The final phase focuses on continuous monitoring, refinement of reduction strategies, and exploration of carbon offsetting programs to achieve ongoing improvements in IT sustainability.</a:t>
             </a:r>
           </a:p>
           <a:p/>
           <a:p>
             <a:pPr algn="just"/>
             <a:r>
-              <a:t>Total Est: 200 hrs (~25.0 days)</a:t>
+              <a:t>Total Est: 300 hrs (~37.5 days)</a:t>
             </a:r>
           </a:p>
           <a:p/>
           <a:p>
             <a:pPr algn="just"/>
             <a:r>
-              <a:t>Key Roles: Environmental Experts, IT Administrators, Data Center Managers, Cooling System Technicians, Energy Experts</a:t>
+              <a:t>Key Roles: IT Administrators, Environmental Experts, Data Center Managers, Cooling System Technicians, Energy Experts</a:t>
             </a:r>
           </a:p>
         </p:txBody>
@@ -16801,7 +16799,7 @@
           <a:p>
             <a:pPr algn="just"/>
             <a:r>
-              <a:t>1. Assess the current carbon footprint associated with server operations by analyzing energy consumption. 2. Collaborate with environmental experts to define appropriate measurement methodologies and metrics for carbon intensity. </a:t>
+              <a:t>1. Assess the current carbon footprint associated with server operations, collaborating with environmental and energy experts and analyzing energy consumption. 2. Conduct an energy efficiency audit of server data centers, collaborating with energy experts and analyzing cooling systems. </a:t>
             </a:r>
           </a:p>
           <a:p>
@@ -16813,7 +16811,7 @@
           <a:p>
             <a:pPr algn="just"/>
             <a:r>
-              <a:t>1. Develop a strategy to minimize the carbon footprint in server operations by implementing energy-efficient practices and utilizing renewable energy. 2. Conduct an energy efficiency audit to assess the energy efficiency of server data centers, analyzing cooling systems. </a:t>
+              <a:t>1. Develop a strategy to minimize the carbon footprint in server operations, implementing energy-efficient practices and utilizing renewable energy. 2. Implement cooling optimization practices based on the audit findings, upgrading cooling systems and monitoring temperature controls. </a:t>
             </a:r>
           </a:p>
           <a:p>
@@ -16825,7 +16823,7 @@
           <a:p>
             <a:pPr algn="just"/>
             <a:r>
-              <a:t>1. Implement cooling optimization practices based on audit findings by upgrading cooling systems and monitoring temperature controls. 2. Establish ongoing monitoring and reporting mechanisms to track carbon intensity and the effectiveness of implemented strategies.</a:t>
+              <a:t>1. Implement a system for ongoing measurement of carbon intensity in IT operations. 2. Regularly review and refine carbon reduction strategies based on performance data. 3. Explore and implement carbon offsetting programs to neutralize remaining emissions.</a:t>
             </a:r>
           </a:p>
           <a:p/>
@@ -16842,10 +16840,41 @@
               <a:t>Subtask Estimates (Aggregated):</a:t>
             </a:r>
           </a:p>
+          <a:p/>
           <a:p>
             <a:pPr algn="just"/>
             <a:r>
-              <a:t>--- Early Steps --- Carbon Footprint Assessment - 30h; Collaboration with Environmental Experts - 20h; --- Intermediate Steps --- Strategy Development - 35h; Implementation of Practices - 15h; Energy Efficiency Audit - 30h; Collaboration with Energy Experts - 20h; --- Advanced Steps --- Cooling System Upgrade - 35h; Temperature Control Monitoring - 15h</a:t>
+              <a:t>--- Early Steps ---</a:t>
+            </a:r>
+          </a:p>
+          <a:p>
+            <a:pPr algn="just"/>
+            <a:r>
+              <a:t>Carbon Footprint Assessment: 30h; Collaboration with Environmental Experts: 20h; Energy Efficiency Audit: 30h; Collaboration with Energy Experts: 20h</a:t>
+            </a:r>
+          </a:p>
+          <a:p>
+            <a:pPr algn="just"/>
+            <a:r>
+              <a:t>--- Intermediate Steps ---</a:t>
+            </a:r>
+          </a:p>
+          <a:p>
+            <a:pPr algn="just"/>
+            <a:r>
+              <a:t>Strategy Development: 35h; Implementation of Practices: 15h; Cooling System Upgrade: 35h; Temperature Control Monitoring: 15h</a:t>
+            </a:r>
+          </a:p>
+          <a:p>
+            <a:pPr algn="just"/>
+            <a:r>
+              <a:t>--- Advanced Steps ---</a:t>
+            </a:r>
+          </a:p>
+          <a:p>
+            <a:pPr algn="just"/>
+            <a:r>
+              <a:t>System Implementation: 30h; Strategy Refinement: 30h; Offset Program Exploration: 40h</a:t>
             </a:r>
           </a:p>
         </p:txBody>
@@ -16969,21 +16998,21 @@
           <a:p>
             <a:pPr algn="just"/>
             <a:r>
-              <a:t>The organization lacks a formal policy and procedures for the responsible disposal and recycling of electronic waste (e-waste), creating significant environmental risk.</a:t>
+              <a:t>The organization lacks a defined process for managing IT equipment from acquisition through retirement, resulting in potential cost inefficiencies and hindering sustainability goals.</a:t>
             </a:r>
           </a:p>
           <a:p/>
           <a:p>
             <a:pPr algn="just"/>
             <a:r>
-              <a:t>The organization's IT equipment lifecycle management is deficient, impacting sustainability and potentially incurring unnecessary costs through inefficient procurement, maintenance, and disposal practices.</a:t>
+              <a:t>A formal electronic waste (e-waste) policy is absent, creating compliance risks and preventing the recovery of valuable materials from end-of-life IT assets.</a:t>
             </a:r>
           </a:p>
           <a:p/>
           <a:p>
             <a:pPr algn="just"/>
             <a:r>
-              <a:t>Implementing a comprehensive e-waste management policy coupled with improved IT equipment lifecycle management practices is crucial to enhance environmental sustainability and operational efficiency.</a:t>
+              <a:t>Material efficiency practices are underdeveloped across key areas – procurement, maintenance, and end-of-life management – indicating a need for foundational improvements to optimize resource utilization within the IT lifecycle.</a:t>
             </a:r>
           </a:p>
         </p:txBody>
@@ -17050,21 +17079,21 @@
           <a:p>
             <a:pPr algn="just"/>
             <a:r>
-              <a:t>This roadmap outlines the implementation of a comprehensive IT resource efficiency and e-waste management program.  It begins with establishing a foundational e-waste disposal policy and progresses through implementing equipment lifecycle management processes, culminating in optimizing resource efficiency and establishing robust reporting mechanisms to track progress and identify areas for improvement. The plan addresses the organization's current lack of a formal e-waste disposal policy and poor equipment lifecycle management practices.</a:t>
+              <a:t>This roadmap outlines a phased approach to improve IT resource efficiency and responsibly manage electronic waste. The initial phase focuses on establishing a baseline understanding of current IT assets and developing a foundational e-waste disposal policy. The intermediate phase operationalizes this policy, integrating sustainability into procurement and developing a basic lifecycle management plan. Finally, the advanced phase focuses on continuous improvement through tracking, evaluation, lifespan extension, and exploration of circular IT practices.</a:t>
             </a:r>
           </a:p>
           <a:p/>
           <a:p>
             <a:pPr algn="just"/>
             <a:r>
-              <a:t>Total Est: 70 hrs (~8.8 days)</a:t>
+              <a:t>Total Est: 44 hrs (~5.5 days)</a:t>
             </a:r>
           </a:p>
           <a:p/>
           <a:p>
             <a:pPr algn="just"/>
             <a:r>
-              <a:t>Key Roles: IT Manager, Sustainability Officer, Procurement Manager, IT Staff</a:t>
+              <a:t>Key Roles: IT Procurement, IT Operations, Sustainability Officer</a:t>
             </a:r>
           </a:p>
         </p:txBody>
@@ -17145,7 +17174,7 @@
           <a:p>
             <a:pPr algn="just"/>
             <a:r>
-              <a:t>1. Research best practices for e-waste management and recycling in the relevant jurisdiction. 2. Draft a basic policy outlining procedures for collecting, sorting, and disposing of e-waste. 3. Identify and contract with a certified e-waste recycler.</a:t>
+              <a:t>1. Conduct a comprehensive inventory of all IT equipment (hardware and software). 2. Research best practices for responsible e-waste disposal and recycling. 3. Draft a preliminary e-waste disposal policy outlining basic guidelines. 4. Identify key stakeholders for policy review and approval.</a:t>
             </a:r>
           </a:p>
           <a:p>
@@ -17157,7 +17186,7 @@
           <a:p>
             <a:pPr algn="just"/>
             <a:r>
-              <a:t>1. Develop a simple inventory system to track IT equipment. 2. Establish basic procedures for equipment maintenance and repair. 3. Integrate the e-waste policy into existing IT procurement and disposal processes.</a:t>
+              <a:t>1. Finalize and formally approve the e-waste disposal policy. 2. Communicate the policy to all relevant employees. 3. Integrate environmental criteria (e.g., energy efficiency, recyclability) into IT procurement guidelines. 4. Develop a basic IT equipment lifecycle management plan outlining procurement, usage, maintenance, and disposal procedures.</a:t>
             </a:r>
           </a:p>
           <a:p>
@@ -17169,14 +17198,14 @@
           <a:p>
             <a:pPr algn="just"/>
             <a:r>
-              <a:t>1. Implement a more robust asset management system to track equipment usage and lifecycle costs. 2. Develop key performance indicators (KPIs) to measure progress towards sustainability goals. 3. Establish regular reporting to monitor progress and identify areas for improvement.</a:t>
+              <a:t>1. Implement a system for tracking e-waste generated by the organization. 2. Evaluate the effectiveness of the e-waste disposal policy and identify areas for improvement. 3. Explore options for extending the lifespan of IT equipment through maintenance and upgrades. 4. Investigate opportunities for circular IT practices, such as equipment refurbishment and reuse.</a:t>
             </a:r>
           </a:p>
           <a:p/>
           <a:p>
             <a:pPr algn="just"/>
             <a:r>
-              <a:t>Tools/Platforms (Overall): None</a:t>
+              <a:t>Tools/Platforms (Overall): Spreadsheets, Inventory Management Software, Policy Management Software, Procurement Systems, E-waste Tracking Software, Lifecycle Management Software</a:t>
             </a:r>
           </a:p>
           <a:p/>
@@ -17186,10 +17215,41 @@
               <a:t>Subtask Estimates (Aggregated):</a:t>
             </a:r>
           </a:p>
+          <a:p/>
           <a:p>
             <a:pPr algn="just"/>
             <a:r>
-              <a:t>--- Early Steps --- Research: 8 hours; Policy Drafting: 12 hours; Recycler Selection: 10 hours; --- Intermediate Steps --- Inventory System: 10 hours; Maintenance Procedures: 5 hours; Policy Integration: 5 hours; --- Advanced Steps --- Asset Management System: 10 hours; KPI Development: 5 hours; Reporting Mechanisms: 5 hours</a:t>
+              <a:t>--- Early Steps ---</a:t>
+            </a:r>
+          </a:p>
+          <a:p>
+            <a:pPr algn="just"/>
+            <a:r>
+              <a:t>Inventory: 8h; Research: 4h; Policy Draft: 4h; Stakeholder ID: 2h</a:t>
+            </a:r>
+          </a:p>
+          <a:p>
+            <a:pPr algn="just"/>
+            <a:r>
+              <a:t>--- Intermediate Steps ---</a:t>
+            </a:r>
+          </a:p>
+          <a:p>
+            <a:pPr algn="just"/>
+            <a:r>
+              <a:t>Policy Finalization: 2h; Communication: 2h; Procurement Integration: 6h; Lifecycle Plan: 4h</a:t>
+            </a:r>
+          </a:p>
+          <a:p>
+            <a:pPr algn="just"/>
+            <a:r>
+              <a:t>--- Advanced Steps ---</a:t>
+            </a:r>
+          </a:p>
+          <a:p>
+            <a:pPr algn="just"/>
+            <a:r>
+              <a:t>Tracking System: 4h; Policy Evaluation: 4h; Lifespan Extension: 2h; Circularity Exploration: 2h</a:t>
             </a:r>
           </a:p>
         </p:txBody>
@@ -17313,21 +17373,21 @@
           <a:p>
             <a:pPr algn="just"/>
             <a:r>
-              <a:t>The organization possesses a strong foundation in modern IT architecture, utilizing microservices, containerization, and APIs. However,  a lack of integrated data management beyond existing data lakes and underdeveloped real-time analytics capabilities hinder the full potential of a data marketplace.  Prioritizing the development of a comprehensive data strategy, including robust data governance and real-time analytics, is crucial.</a:t>
+              <a:t>The organization excels at adopting modern IT practices – containerization, data lakes, and APIs – but currently prioritizes technical implementation over demonstrating how these technologies directly contribute to measurable sustainability improvements beyond standard business KPIs. This creates a risk of ‘tech for tech’s sake’ rather than impactful, sustainable digital transformation.</a:t>
             </a:r>
           </a:p>
           <a:p/>
           <a:p>
             <a:pPr algn="just"/>
             <a:r>
-              <a:t>The shift towards a product-centric IT structure is a positive step, but requires strengthening agile development practices and integrating sustainability considerations into the development lifecycle.  Implementing formalized agile frameworks, enhancing cross-functional collaboration, and embedding sustainability principles will improve the efficiency and effectiveness of IT delivery.</a:t>
+              <a:t>Sustainability initiatives are largely reactive and focused on achieving existing business goals, neglecting proactive consideration of broader environmental and social impacts. A shift is needed to integrate sustainability as a core value driving innovation and strategic decision-making, not simply a reporting metric.</a:t>
             </a:r>
           </a:p>
           <a:p/>
           <a:p>
             <a:pPr algn="just"/>
             <a:r>
-              <a:t>A significant challenge is fostering a culture of innovation.  The lack of executive sponsorship and established innovation processes limits the organization's ability to embed innovation effectively.  Securing executive buy-in and establishing structured, repeatable innovation processes, including dedicated resources and clear success metrics, are essential for driving sustained growth and transformation.</a:t>
+              <a:t>Innovation efforts are fragmented and lack consistent executive support, preventing sustainability-focused ideas from scaling and becoming embedded within the organization’s core strategy. Establishing clear innovation processes with leadership sponsorship is crucial to fostering a culture where sustainable solutions are actively developed and implemented.</a:t>
             </a:r>
           </a:p>
         </p:txBody>
@@ -17394,21 +17454,21 @@
           <a:p>
             <a:pPr algn="just"/>
             <a:r>
-              <a:t>This roadmap details the evolution of the organization's IT operating model towards a sustainable, product-centric, cloud-native architecture.  It emphasizes agile practices, API strategies, and hybrid cloud adoption, while integrating sustainability into the organizational culture. The plan progresses through three phases: foundational agile and microservices implementation, process integration and automation, and finally, AI-driven optimization and governance. Each phase builds upon the previous one, culminating in a highly efficient and sustainable digital ecosystem.</a:t>
+              <a:t>This roadmap outlines a phased approach to achieving sustainable digital transformation. The initial phase focuses on foundational modernization, integrating IT with business functions, and adopting agile practices. The intermediate phase emphasizes process integration, automation, and aligning programs with key business outcomes. Finally, the advanced phase leverages AI/ML-driven insights, continuous process improvement, and executive sponsorship to foster a culture of innovation and maximize sustainability benefits.</a:t>
             </a:r>
           </a:p>
           <a:p/>
           <a:p>
             <a:pPr algn="just"/>
             <a:r>
-              <a:t>Total Est: 180 hrs (~22.5 days)</a:t>
+              <a:t>Total Est: 190 hrs (~23.8 days)</a:t>
             </a:r>
           </a:p>
           <a:p/>
           <a:p>
             <a:pPr algn="just"/>
             <a:r>
-              <a:t>Key Roles: Developers, IT Architects, DevOps Engineers, Business Analysts, Sustainability Managers, Data Scientists</a:t>
+              <a:t>Key Roles: IT Architects, Developers, Business Analysts, Security Professionals, Innovation Managers, Data Scientists</a:t>
             </a:r>
           </a:p>
         </p:txBody>
@@ -17489,7 +17549,7 @@
           <a:p>
             <a:pPr algn="just"/>
             <a:r>
-              <a:t>1. Implement iterative development processes and enhance collaboration within development teams. 2. Introduce formalized agile frameworks (e.g., Scrum). 3. Embrace containerization for microservices architecture and develop basic data lakes for real-time analytics. 4. Implement RESTful APIs with API gateways for seamless communication. 5. Integrate IT as an integral part of business strategy and embed sustainability principles in core business functions. 6. Foster a culture of innovation and sustainability.</a:t>
+              <a:t>1. Embrace containerization for a microservices architecture. 2. Develop matured data lakes for real-time analytics. 3. Implement RESTful APIs with API gateways for seamless communication. 4. Integrate IT as an integral part of business strategy. 5. Introduce iterative development processes and enhance collaboration within development teams. 6. Implement Scrum for an agile framework.</a:t>
             </a:r>
           </a:p>
           <a:p>
@@ -17501,7 +17561,7 @@
           <a:p>
             <a:pPr algn="just"/>
             <a:r>
-              <a:t>1. Create self-service capabilities for infrastructure deployment. 2. Adopt Micro Services, Containers, and Serverless computing. 3. Develop dynamic cloud applications that are auto-scalable and fault-tolerant. 4. Center programs on driving specific business outcomes and measure success based on the achievement of business objectives. 5. Evaluate the percentage of projects successfully transitioning to product-centric IT and allocate innovation to business units with defined strategies. 6. Establish initial processes for innovation, avoiding silos.</a:t>
+              <a:t>1. Create self-service capabilities for infrastructure deployment. 2. Adopt Micro Services, Containers, and Serverless computing. 3. Develop dynamic cloud applications that are auto-scalable and fault-tolerant. 4. Center programs on driving specific business outcomes and measure success based on the achievement of business objectives. 5. Allocate innovation to business units with defined strategies.</a:t>
             </a:r>
           </a:p>
           <a:p>
@@ -17513,14 +17573,14 @@
           <a:p>
             <a:pPr algn="just"/>
             <a:r>
-              <a:t>1. Implement AI and ML-enabled algorithms for advanced tasks and leverage human-like intelligence to enhance decision-making. 2. Continuously evolve cognitive capabilities for ongoing innovation. 3. Adopt a KPI-based perspective for operations and drive process improvement for business outcomes. 4. Seek executive sponsorship for innovation initiatives.</a:t>
+              <a:t>1. Implement AI and ML-enabled algorithms for advanced tasks. 2. Leverage human-like intelligence to enhance decision-making and continuously evolve cognitive capabilities for ongoing innovation. 3. Adopt a KPI-based perspective for operations and drive process improvement for business outcomes. 4. Seek executive sponsorship for innovation initiatives and establish initial processes for innovation, avoiding silos.</a:t>
             </a:r>
           </a:p>
           <a:p/>
           <a:p>
             <a:pPr algn="just"/>
             <a:r>
-              <a:t>Tools/Platforms (Overall): Jira, Git, Kubernetes, Docker, Scrum, AWS Lambda, ServiceNow, Taiga, Spigit, TensorFlow, IBM Watson, Grafana, Salesforce</a:t>
+              <a:t>Tools/Platforms (Overall): Kubernetes, Azure DevOps, Docker, Jira, Git-scm, Odoo, AWS Lambda, ServiceNow, Spigit, Grafana, TensorFlow, IBM Watson, Salesforce, GitHub</a:t>
             </a:r>
           </a:p>
           <a:p/>
@@ -17533,7 +17593,25 @@
           <a:p>
             <a:pPr algn="just"/>
             <a:r>
-              <a:t>--- Early Steps --- Various tasks: 10-20 hours each; --- Intermediate Steps --- Various tasks: 15-30 hours each; --- Advanced Steps --- Various tasks: 20-30 hours each</a:t>
+              <a:t>--- Early Steps ---</a:t>
+            </a:r>
+          </a:p>
+          <a:p>
+            <a:pPr algn="just"/>
+            <a:r>
+              <a:t>Containerization: 10h; Data Lakes: 15h; APIs: 10h; Business Integration: 5h; Agile Implementation: 5h; Collaboration: 5h; Scrum: 5h; --- Intermediate Steps ---</a:t>
+            </a:r>
+          </a:p>
+          <a:p>
+            <a:pPr algn="just"/>
+            <a:r>
+              <a:t>Self-Service: 10h; Serverless: 10h; Dynamic Apps: 5h; Outcome Programs: 5h; KPI Measurement: 5h; Innovation Allocation: 5h; --- Advanced Steps ---</a:t>
+            </a:r>
+          </a:p>
+          <a:p>
+            <a:pPr algn="just"/>
+            <a:r>
+              <a:t>AI/ML Implementation: 10h; Cognitive Enhancement: 5h; Continuous Evolution: 5h; KPI Operations: 5h; Process Improvement: 5h; Executive Sponsorship: 5h; Innovation Processes: 30h</a:t>
             </a:r>
           </a:p>
         </p:txBody>
@@ -17657,21 +17735,21 @@
           <a:p>
             <a:pPr algn="just"/>
             <a:r>
-              <a:t>The organization's server infrastructure lacks essential monitoring, logging, and security features, creating significant risks of performance bottlenecks, security breaches, and non-compliance.  Addressing these deficiencies requires immediate action, including implementing a comprehensive monitoring and alerting system, centralized logging, and robust security measures (firewalls, intrusion detection, regular patching, and access controls).  This will necessitate a substantial time investment (estimated at over 700 hours).</a:t>
+              <a:t>The organization demonstrates a critical lack of foundational server management practices, including logging, monitoring, performance analysis, and capacity planning, indicating a fully reactive operational model. Addressing this requires an estimated 265-350+ man-hours to establish core capabilities and prevent future downtime and resource inefficiencies.</a:t>
             </a:r>
           </a:p>
           <a:p/>
           <a:p>
             <a:pPr algn="just"/>
             <a:r>
-              <a:t>The current server infrastructure lacks sufficient redundancy and high availability features, increasing the risk of downtime and service disruptions.  Implementing redundancy and high availability requires a dedicated effort (estimated at 175 hours) including risk assessment and solution implementation.</a:t>
+              <a:t>Server security and resilience are currently non-existent, with no implementation of essential controls like patching, firewalls, intrusion detection, redundancy, or access controls. This poses a high risk of outages, data breaches, and non-compliance, demanding immediate attention and an estimated 590+ man-hours for initial remediation.</a:t>
             </a:r>
           </a:p>
           <a:p/>
           <a:p>
             <a:pPr algn="just"/>
             <a:r>
-              <a:t>Prioritization and phased implementation of necessary infrastructure improvements are crucial due to the significant time and resource commitment required (over 700 hours total estimated effort across multiple areas).  A detailed plan outlining priorities, resource allocation, and implementation timelines is needed to effectively manage this undertaking and mitigate risks.</a:t>
+              <a:t>A significant barrier to improvement appears to be a lack of internal expertise rather than simply a lack of tooling. The organization would benefit from external support or targeted training to build the necessary skills for ongoing server optimization, security implementation, and proactive management.</a:t>
             </a:r>
           </a:p>
         </p:txBody>
@@ -17738,21 +17816,21 @@
           <a:p>
             <a:pPr algn="just"/>
             <a:r>
-              <a:t>This roadmap outlines a comprehensive plan to enhance server performance, security, and scalability.  The early phase focuses on establishing a baseline for monitoring, resource management, and security assessments, including identifying single points of failure and developing foundational policies. The intermediate phase integrates selected tools, automates processes, implements redundancy plans, and establishes automated patching.  The advanced phase implements advanced optimization techniques, such as load balancing and intrusion detection systems, to ensure high availability and robust security.  Throughout, rigorous testing and monitoring are crucial.</a:t>
+              <a:t>This roadmap addresses critical gaps in server infrastructure, focusing on monitoring, security, redundancy, and performance. The initial phase establishes foundational monitoring and risk assessment, identifying single points of failure and developing essential security policies. The intermediate phase integrates selected tools for logging, caching, load balancing, and automated patching, aligning them with established policies. Finally, the advanced phase focuses on performance optimization, capacity planning, and implementing redundancy solutions, ensuring high availability, data protection, and scalability to support business growth.</a:t>
             </a:r>
           </a:p>
           <a:p/>
           <a:p>
             <a:pPr algn="just"/>
             <a:r>
-              <a:t>Total Est: 1030 hrs (~128.8 days)</a:t>
+              <a:t>Total Est: 860 hrs (~107.5 days)</a:t>
             </a:r>
           </a:p>
           <a:p/>
           <a:p>
             <a:pPr algn="just"/>
             <a:r>
-              <a:t>Key Roles: IT Specialists, Logging System Analysts, IT Administrators, Logging System Integrators, Caching Strategists, Development Teams, IT Architects, Infrastructure Managers, Scalability Planning Team, IT Leadership, Testing Teams, Monitoring Team, Monitoring Administrators, Business Analysts, Network Administrators, Optimization Experts, Security Analysts, Compliance Specialists, Data Management Specialists, QA Engineers, Performance Analysts, Load Balancer Administrators, IT Security Specialists, System Administrators, Patch Management Experts, Redundancy Planning Team</a:t>
+              <a:t>Key Roles: IT Specialists, IT Administrators, Monitoring Teams, Security Analysts, Compliance Specialists, Business Analysts, Infrastructure Managers, Scalability Planning Team, IT Leadership, Application Developers, Performance Analysts, Network Administrators, Optimization Experts, Testing Team, Logging System Analysts, Alerting System Analysts, Caching Strategists, Infrastructure Team, Data Management Specialists, Redundancy Planning Team, Patch Management Experts, System Administrators, IT Security Specialists</a:t>
             </a:r>
           </a:p>
         </p:txBody>
@@ -17833,7 +17911,7 @@
           <a:p>
             <a:pPr algn="just"/>
             <a:r>
-              <a:t>1. Evaluate centralized logging systems and select a suitable solution; 2. Develop a caching strategy based on server workload and application requirements; 3. Analyze current and projected resource demands for server infrastructure; 4. Assess the current server infrastructure for scalability gaps and identify single points of failure; 5. Evaluate and select a resource monitoring tool for server infrastructure; 6. Evaluate alerting systems to choose an effective solution; 7. Conduct a network assessment to identify areas for optimization; 8. Develop a plan for performance testing of critical server applications; 9. Develop a policy for retaining historical performance data; 10. Assess the current server infrastructure for high availability; 11. Conduct a security threat assessment to identify potential risks and vulnerabilities; 12. Develop an access control policy defining user permissions and restrictions.</a:t>
+              <a:t>1. Evaluate centralized logging systems to choose the most suitable one, researching solutions and considering scalability and compatibility. 2. Evaluate and select a resource monitoring tool for server infrastructure, aligning it with infrastructure requirements. 3. Evaluate alerting systems to choose an effective solution, considering real-time monitoring capabilities. 4. Conduct a network assessment to identify areas for optimization, analyzing traffic patterns. 5. Assess current server infrastructure for scalability gaps, collaborating with IT architects and conducting workload analysis. 6. Assess the current server infrastructure for high availability and identify single points of failure. 7. Develop a patch management policy outlining the frequency and process for updates, collaborating with system administrators. 8. Conduct a security threat assessment to identify potential risks and vulnerabilities, performing risk analysis. 9. Develop an access control policy defining user permissions and restrictions, collaborating with system administrators.</a:t>
             </a:r>
           </a:p>
           <a:p>
@@ -17845,7 +17923,7 @@
           <a:p>
             <a:pPr algn="just"/>
             <a:r>
-              <a:t>1. Integrate the selected logging system into your server infrastructure; 2. Evaluate and select caching mechanisms aligned with the developed strategy; 3. Develop a plan to ensure server resources meet current and future demands; 4. Develop a plan for enhancing server infrastructure scalability; 5. Configure and integrate the selected monitoring tool with the server infrastructure; 6. Configure alerts based on abnormal server behavior or performance issues; 7. Develop a plan outlining optimizations based on assessment findings; 8. Execute performance testing on critical server applications; 9. Develop a redundancy plan to enhance server infrastructure availability; 10. Evaluate and implement automated patching tools for efficient updates.</a:t>
+              <a:t>1. Integrate the selected logging system into your server infrastructure, configuring log sources and collaborating with IT teams. 2. Configure and integrate the selected monitoring tool with the server infrastructure, following tool documentation and testing configurations. 3. Configure alerts based on abnormal server behavior or performance issues, defining alert thresholds and collaborating with monitoring teams. 4. Configure the selected load balancer for your server infrastructure, following load balancer documentation and testing configurations. 5. Develop a caching strategy based on server workload and application requirements, collaborating with development teams and analyzing application behavior. 6. Develop a process for auditing server logs for security and compliance, defining audit criteria and collaborating with security and compliance teams. 7. Identify redundancy solutions and create a mitigation plan. 8. Evaluate and implement automated patching tools for efficient updates, aligning with policy requirements. 9. Evaluate and select an IDS solution suitable for the infrastructure, aligning with the threat assessment. 10. Evaluate and select a firewall solution aligned with access control policies.</a:t>
             </a:r>
           </a:p>
           <a:p>
@@ -17857,14 +17935,14 @@
           <a:p>
             <a:pPr algn="just"/>
             <a:r>
-              <a:t>1. Implement the planned upgrades to enhance scalability; 2. Implement load balancing in the production environment and conduct testing; 3. Implement the data retention policy and monitor its effectiveness; 4. Regularly review and analyze server logs according to the developed process; 5. Implement identified optimizations and monitor the impact; 6. Implement the planned redundancy measures in the server infrastructure; 7. Evaluate and select an IDS solution suitable for the infrastructure; 8. Implement the selected firewall solution and conduct testing.</a:t>
+              <a:t>1. Implement selected caching mechanisms and conduct testing, configuring caching and performing load testing. 2. Implement the planned upgrades to enhance scalability, upgrading hardware and implementing scaling solutions. 3. Implement resource monitoring in the production environment and provide training, rolling out the solution and training relevant teams. 4. Execute performance testing on critical server applications, using testing tools and analyzing results. 5. Develop a roadmap for scaling server infrastructure based on growth assessments, defining milestones and collaborating with IT and business teams. 6. Implement identified optimizations and monitor the impact, making configuration changes and analyzing performance. 7. Upgrade hardware and configure redundant systems. 8. Configure firewall rules and perform security testing. 9. Implement the selected IDS solution and integrate it into the server infrastructure, performing integration testing. 10. Implement the selected firewall solution and conduct testing.</a:t>
             </a:r>
           </a:p>
           <a:p/>
           <a:p>
             <a:pPr algn="just"/>
             <a:r>
-              <a:t>Tools/Platforms (Overall): ELK Stack, Splunk, Redis, Varnish, Akamai, Cloudflare, Collectd, Datadog, docker, kubernetes, Amazon ECS, Google Kubernetes Engine, Grafana, Prometheus, Prometheus Alertmanager, OpsGenie, PagerDuty, iperf, SolarWinds Network Performance Monitor, Apache JMeter, LoadRunner, Dynatrace, InfluxDB, AppDynamics, Keepalived, Veeam Backup &amp; Replication, OpenVAS, Tenable, Qualys, Snort, Cisco Firepower, Suricata, iptables, Cisco ASA, Palo Alto Networks, HAProxy, Nginx, Citrix ADC, F5 BIG-IP, Wazuh, SolarWinds Security Event Manager</a:t>
+              <a:t>Tools/Platforms (Overall): ELK Stack (Elasticsearch, Logstash, Kibana), Splunk, Grafana, Prometheus, Dynatrace, InfluxDB, OpsGenie, PagerDuty, HAProxy, Nginx, Citrix ADC, F5 BIG-IP, Redis, Varnish, Akamai, Cloudflare, Keepalived, OpenVAS, Veeam Backup &amp; Replication, iptables, Tenable, Qualys, Snort, Cisco Firepower, Suricata, Cisco ASA, Palo Alto Networks, docker, kubernetes, Amazon ECS, Google Kubernetes Engine (GKE), OpenStack, VMware vSphere, Apache JMeter, LoadRunner, Datadog, New Relic, Collectd</a:t>
             </a:r>
           </a:p>
           <a:p/>
@@ -17877,7 +17955,37 @@
           <a:p>
             <a:pPr algn="just"/>
             <a:r>
-              <a:t>--- Early Steps --- Evaluation: 40 hours; Research: 30 hours; Strategy Development: 50 hours; Collaboration with Development Teams: 40 hours; Demand Analysis: 50 hours; Collaboration with Business and IT Teams: 40 hours; Scalability Analysis: 50 hours; Collaboration with IT Architects: 40 hours; Monitoring Tool Research: 40 hours; Alignment with Requirements: 30 hours; Evaluation: 40 hours; Research: 30 hours; Assessment: 40 hours; Traffic Pattern Analysis: 30 hours; Plan Development: 50 hours; Scenario Identification: 40 hours; Success Criteria Definition: 30 hours; Policy Development: 40 hours; Collaboration with Data Management Teams: 30 hours; Risk Assessment: 25 hours; Single Point of Failure Identification: 20 hours; Threat Assessment: 20 hours; Risk Analysis: 15 hours; Policy Development: 20 hours; Collaboration with System Administrators: 15 hours; --- Intermediate Steps --- Integration: 60 hours; Collaboration with IT Teams: 50 hours; Research: 40 hours; Alignment with Strategy: 30 hours; Capacity Planning: 60 hours; Collaboration with IT and Business Teams: 50 hours; Solution Identification: 60 hours; Roadmap Creation: 50 hours; Configuration Setup: 60 hours; Testing: 50 hours; Configuration: 60 hours; Collaboration with Monitoring Teams: 50 hours; Plan Development: 50 hours; Collaboration with Experts: 40 hours; Testing Execution: 70 hours; Results Analysis: 40 hours; Solution Identification: 30 hours; Mitigation Plan Creation: 25 hours; Research: 25 hours; Alignment with Policy Requirements: 20 hours; --- Advanced Steps --- Hardware Upgrade: 80 hours; Scaling Solution Implementation: 70 hours; Rollout: 70 hours; Performance Testing: 60 hours; Implementation: 60 hours; Monitoring Effectiveness: 50 hours; Review and Analysis: 60 hours; Collaboration with IT and Compliance Teams: 50 hours; Implementation: 60 hours; Performance Monitoring: 50 hours; Hardware Upgrade: 40 hours; Redundancy Configuration: 35 hours; Research: 25 hours; Alignment with Threat Assessment: 20 hours; Configuration: 30 hours; Security Testing: 25 hours</a:t>
+              <a:t>--- Early Steps ---</a:t>
+            </a:r>
+          </a:p>
+          <a:p>
+            <a:pPr algn="just"/>
+            <a:r>
+              <a:t>Evaluation: 40h; Research: 30h; Monitoring Tool Research: 40h; Alignment with Requirements: 30h; Assessment: 40h; Traffic Pattern Analysis: 30h; Scalability Analysis: 50h; Collaboration with IT Architects: 40h; Risk Assessment: 25h; Single Point of Failure Identification: 20h; Policy Development: 40h; Collaboration with System Administrators: 30h; Threat Assessment: 40h; Risk Analysis: 30h; Policy Development: 40h; Collaboration with System Administrators: 30h</a:t>
+            </a:r>
+          </a:p>
+          <a:p>
+            <a:pPr algn="just"/>
+            <a:r>
+              <a:t>--- Intermediate Steps ---</a:t>
+            </a:r>
+          </a:p>
+          <a:p>
+            <a:pPr algn="just"/>
+            <a:r>
+              <a:t>Integration: 60h; Collaboration with IT Teams: 50h; Configuration Setup: 60h; Testing: 50h; Configuration: 60h; Collaboration with Monitoring Teams: 50h; Configuration Setup: 60h; Testing: 50h; Strategy Development: 50h; Collaboration with Development Teams: 40h; Process Development: 40h; Collaboration with Security and Compliance Teams: 30h; Solution Identification: 30h; Mitigation Plan Creation: 25h; Research: 50h; Alignment with Policy Requirements: 40h; Research: 50h; Alignment with Threat Assessment: 40h; Research: 50h; Alignment with Policy Requirements: 40h</a:t>
+            </a:r>
+          </a:p>
+          <a:p>
+            <a:pPr algn="just"/>
+            <a:r>
+              <a:t>--- Advanced Steps ---</a:t>
+            </a:r>
+          </a:p>
+          <a:p>
+            <a:pPr algn="just"/>
+            <a:r>
+              <a:t>Configuration: 60h; Load Testing: 50h; Hardware Upgrade: 80h; Scaling Solution Implementation: 70h; Rollout: 70h; Training: 60h; Testing Execution: 70h; Results Analysis: 40h; Roadmap Development: 60h; Collaboration with IT and Business Teams: 50h; Implementation: 60h; Performance Monitoring: 50h; Hardware Upgrade: 40h; Redundancy Configuration: 35h; Configuration: 60h; Security Testing: 50h; Configuration: 60h; Integration Testing: 50h; Configuration: 60h; Security Testing: 50h</a:t>
             </a:r>
           </a:p>
         </p:txBody>

</xml_diff>